<commit_message>
readying Chapters 8 & 9 for ER
</commit_message>
<xml_diff>
--- a/content/ch/02/figures/ConstructDesignsRe tangles.pptx
+++ b/content/ch/02/figures/ConstructDesignsRe tangles.pptx
@@ -8978,70 +8978,6 @@
           </p:sp>
         </p:grpSp>
       </p:grpSp>
-      <p:sp>
-        <p:nvSpPr>
-          <p:cNvPr id="75" name="TextBox 74">
-            <a:extLst>
-              <a:ext uri="{FF2B5EF4-FFF2-40B4-BE49-F238E27FC236}">
-                <a16:creationId xmlns:a16="http://schemas.microsoft.com/office/drawing/2014/main" id="{22C13932-87A9-2149-B131-EACCFE47A691}"/>
-              </a:ext>
-            </a:extLst>
-          </p:cNvPr>
-          <p:cNvSpPr txBox="1"/>
-          <p:nvPr/>
-        </p:nvSpPr>
-        <p:spPr>
-          <a:xfrm>
-            <a:off x="1866378" y="5661764"/>
-            <a:ext cx="184731" cy="369332"/>
-          </a:xfrm>
-          <a:prstGeom prst="rect">
-            <a:avLst/>
-          </a:prstGeom>
-          <a:noFill/>
-        </p:spPr>
-        <p:txBody>
-          <a:bodyPr wrap="none" rtlCol="0">
-            <a:spAutoFit/>
-          </a:bodyPr>
-          <a:lstStyle/>
-          <a:p>
-            <a:endParaRPr lang="en-US" dirty="0"/>
-          </a:p>
-        </p:txBody>
-      </p:sp>
-      <p:sp>
-        <p:nvSpPr>
-          <p:cNvPr id="76" name="TextBox 75">
-            <a:extLst>
-              <a:ext uri="{FF2B5EF4-FFF2-40B4-BE49-F238E27FC236}">
-                <a16:creationId xmlns:a16="http://schemas.microsoft.com/office/drawing/2014/main" id="{7D5769D8-AC68-3E44-ABAC-B1B91451984E}"/>
-              </a:ext>
-            </a:extLst>
-          </p:cNvPr>
-          <p:cNvSpPr txBox="1"/>
-          <p:nvPr/>
-        </p:nvSpPr>
-        <p:spPr>
-          <a:xfrm>
-            <a:off x="1114816" y="5348614"/>
-            <a:ext cx="184731" cy="369332"/>
-          </a:xfrm>
-          <a:prstGeom prst="rect">
-            <a:avLst/>
-          </a:prstGeom>
-          <a:noFill/>
-        </p:spPr>
-        <p:txBody>
-          <a:bodyPr wrap="none" rtlCol="0">
-            <a:spAutoFit/>
-          </a:bodyPr>
-          <a:lstStyle/>
-          <a:p>
-            <a:endParaRPr lang="en-US" dirty="0"/>
-          </a:p>
-        </p:txBody>
-      </p:sp>
     </p:spTree>
     <p:extLst>
       <p:ext uri="{BB962C8B-B14F-4D97-AF65-F5344CB8AC3E}">

</xml_diff>